<commit_message>
Basisdatei wird als ISO-8859-1 encodiert angesehen
</commit_message>
<xml_diff>
--- a/misc/Dokumentation/AD-Prozess.pptx
+++ b/misc/Dokumentation/AD-Prozess.pptx
@@ -288,7 +288,8 @@
           <a:p>
             <a:fld id="{4CC83A48-1FCF-43AC-941A-BEE3FB3F64A8}" type="datetimeFigureOut">
               <a:rPr lang="de-DE" smtClean="0"/>
-              <a:t>06.02.2016</a:t>
+              <a:pPr/>
+              <a:t>19.11.2016</a:t>
             </a:fld>
             <a:endParaRPr lang="de-DE"/>
           </a:p>
@@ -330,6 +331,7 @@
           <a:p>
             <a:fld id="{848EDE83-18D9-40CC-8B5D-A60B62A00906}" type="slidenum">
               <a:rPr lang="de-DE" smtClean="0"/>
+              <a:pPr/>
               <a:t>‹Nr.›</a:t>
             </a:fld>
             <a:endParaRPr lang="de-DE"/>
@@ -453,7 +455,8 @@
           <a:p>
             <a:fld id="{4CC83A48-1FCF-43AC-941A-BEE3FB3F64A8}" type="datetimeFigureOut">
               <a:rPr lang="de-DE" smtClean="0"/>
-              <a:t>06.02.2016</a:t>
+              <a:pPr/>
+              <a:t>19.11.2016</a:t>
             </a:fld>
             <a:endParaRPr lang="de-DE"/>
           </a:p>
@@ -495,6 +498,7 @@
           <a:p>
             <a:fld id="{848EDE83-18D9-40CC-8B5D-A60B62A00906}" type="slidenum">
               <a:rPr lang="de-DE" smtClean="0"/>
+              <a:pPr/>
               <a:t>‹Nr.›</a:t>
             </a:fld>
             <a:endParaRPr lang="de-DE"/>
@@ -628,7 +632,8 @@
           <a:p>
             <a:fld id="{4CC83A48-1FCF-43AC-941A-BEE3FB3F64A8}" type="datetimeFigureOut">
               <a:rPr lang="de-DE" smtClean="0"/>
-              <a:t>06.02.2016</a:t>
+              <a:pPr/>
+              <a:t>19.11.2016</a:t>
             </a:fld>
             <a:endParaRPr lang="de-DE"/>
           </a:p>
@@ -670,6 +675,7 @@
           <a:p>
             <a:fld id="{848EDE83-18D9-40CC-8B5D-A60B62A00906}" type="slidenum">
               <a:rPr lang="de-DE" smtClean="0"/>
+              <a:pPr/>
               <a:t>‹Nr.›</a:t>
             </a:fld>
             <a:endParaRPr lang="de-DE"/>
@@ -793,7 +799,8 @@
           <a:p>
             <a:fld id="{4CC83A48-1FCF-43AC-941A-BEE3FB3F64A8}" type="datetimeFigureOut">
               <a:rPr lang="de-DE" smtClean="0"/>
-              <a:t>06.02.2016</a:t>
+              <a:pPr/>
+              <a:t>19.11.2016</a:t>
             </a:fld>
             <a:endParaRPr lang="de-DE"/>
           </a:p>
@@ -835,6 +842,7 @@
           <a:p>
             <a:fld id="{848EDE83-18D9-40CC-8B5D-A60B62A00906}" type="slidenum">
               <a:rPr lang="de-DE" smtClean="0"/>
+              <a:pPr/>
               <a:t>‹Nr.›</a:t>
             </a:fld>
             <a:endParaRPr lang="de-DE"/>
@@ -1034,7 +1042,8 @@
           <a:p>
             <a:fld id="{4CC83A48-1FCF-43AC-941A-BEE3FB3F64A8}" type="datetimeFigureOut">
               <a:rPr lang="de-DE" smtClean="0"/>
-              <a:t>06.02.2016</a:t>
+              <a:pPr/>
+              <a:t>19.11.2016</a:t>
             </a:fld>
             <a:endParaRPr lang="de-DE"/>
           </a:p>
@@ -1076,6 +1085,7 @@
           <a:p>
             <a:fld id="{848EDE83-18D9-40CC-8B5D-A60B62A00906}" type="slidenum">
               <a:rPr lang="de-DE" smtClean="0"/>
+              <a:pPr/>
               <a:t>‹Nr.›</a:t>
             </a:fld>
             <a:endParaRPr lang="de-DE"/>
@@ -1317,7 +1327,8 @@
           <a:p>
             <a:fld id="{4CC83A48-1FCF-43AC-941A-BEE3FB3F64A8}" type="datetimeFigureOut">
               <a:rPr lang="de-DE" smtClean="0"/>
-              <a:t>06.02.2016</a:t>
+              <a:pPr/>
+              <a:t>19.11.2016</a:t>
             </a:fld>
             <a:endParaRPr lang="de-DE"/>
           </a:p>
@@ -1359,6 +1370,7 @@
           <a:p>
             <a:fld id="{848EDE83-18D9-40CC-8B5D-A60B62A00906}" type="slidenum">
               <a:rPr lang="de-DE" smtClean="0"/>
+              <a:pPr/>
               <a:t>‹Nr.›</a:t>
             </a:fld>
             <a:endParaRPr lang="de-DE"/>
@@ -1734,7 +1746,8 @@
           <a:p>
             <a:fld id="{4CC83A48-1FCF-43AC-941A-BEE3FB3F64A8}" type="datetimeFigureOut">
               <a:rPr lang="de-DE" smtClean="0"/>
-              <a:t>06.02.2016</a:t>
+              <a:pPr/>
+              <a:t>19.11.2016</a:t>
             </a:fld>
             <a:endParaRPr lang="de-DE"/>
           </a:p>
@@ -1776,6 +1789,7 @@
           <a:p>
             <a:fld id="{848EDE83-18D9-40CC-8B5D-A60B62A00906}" type="slidenum">
               <a:rPr lang="de-DE" smtClean="0"/>
+              <a:pPr/>
               <a:t>‹Nr.›</a:t>
             </a:fld>
             <a:endParaRPr lang="de-DE"/>
@@ -1847,7 +1861,8 @@
           <a:p>
             <a:fld id="{4CC83A48-1FCF-43AC-941A-BEE3FB3F64A8}" type="datetimeFigureOut">
               <a:rPr lang="de-DE" smtClean="0"/>
-              <a:t>06.02.2016</a:t>
+              <a:pPr/>
+              <a:t>19.11.2016</a:t>
             </a:fld>
             <a:endParaRPr lang="de-DE"/>
           </a:p>
@@ -1889,6 +1904,7 @@
           <a:p>
             <a:fld id="{848EDE83-18D9-40CC-8B5D-A60B62A00906}" type="slidenum">
               <a:rPr lang="de-DE" smtClean="0"/>
+              <a:pPr/>
               <a:t>‹Nr.›</a:t>
             </a:fld>
             <a:endParaRPr lang="de-DE"/>
@@ -1937,7 +1953,8 @@
           <a:p>
             <a:fld id="{4CC83A48-1FCF-43AC-941A-BEE3FB3F64A8}" type="datetimeFigureOut">
               <a:rPr lang="de-DE" smtClean="0"/>
-              <a:t>06.02.2016</a:t>
+              <a:pPr/>
+              <a:t>19.11.2016</a:t>
             </a:fld>
             <a:endParaRPr lang="de-DE"/>
           </a:p>
@@ -1979,6 +1996,7 @@
           <a:p>
             <a:fld id="{848EDE83-18D9-40CC-8B5D-A60B62A00906}" type="slidenum">
               <a:rPr lang="de-DE" smtClean="0"/>
+              <a:pPr/>
               <a:t>‹Nr.›</a:t>
             </a:fld>
             <a:endParaRPr lang="de-DE"/>
@@ -2209,7 +2227,8 @@
           <a:p>
             <a:fld id="{4CC83A48-1FCF-43AC-941A-BEE3FB3F64A8}" type="datetimeFigureOut">
               <a:rPr lang="de-DE" smtClean="0"/>
-              <a:t>06.02.2016</a:t>
+              <a:pPr/>
+              <a:t>19.11.2016</a:t>
             </a:fld>
             <a:endParaRPr lang="de-DE"/>
           </a:p>
@@ -2251,6 +2270,7 @@
           <a:p>
             <a:fld id="{848EDE83-18D9-40CC-8B5D-A60B62A00906}" type="slidenum">
               <a:rPr lang="de-DE" smtClean="0"/>
+              <a:pPr/>
               <a:t>‹Nr.›</a:t>
             </a:fld>
             <a:endParaRPr lang="de-DE"/>
@@ -2457,7 +2477,8 @@
           <a:p>
             <a:fld id="{4CC83A48-1FCF-43AC-941A-BEE3FB3F64A8}" type="datetimeFigureOut">
               <a:rPr lang="de-DE" smtClean="0"/>
-              <a:t>06.02.2016</a:t>
+              <a:pPr/>
+              <a:t>19.11.2016</a:t>
             </a:fld>
             <a:endParaRPr lang="de-DE"/>
           </a:p>
@@ -2499,6 +2520,7 @@
           <a:p>
             <a:fld id="{848EDE83-18D9-40CC-8B5D-A60B62A00906}" type="slidenum">
               <a:rPr lang="de-DE" smtClean="0"/>
+              <a:pPr/>
               <a:t>‹Nr.›</a:t>
             </a:fld>
             <a:endParaRPr lang="de-DE"/>
@@ -2665,7 +2687,8 @@
           <a:p>
             <a:fld id="{4CC83A48-1FCF-43AC-941A-BEE3FB3F64A8}" type="datetimeFigureOut">
               <a:rPr lang="de-DE" smtClean="0"/>
-              <a:t>06.02.2016</a:t>
+              <a:pPr/>
+              <a:t>19.11.2016</a:t>
             </a:fld>
             <a:endParaRPr lang="de-DE"/>
           </a:p>
@@ -2743,6 +2766,7 @@
           <a:p>
             <a:fld id="{848EDE83-18D9-40CC-8B5D-A60B62A00906}" type="slidenum">
               <a:rPr lang="de-DE" smtClean="0"/>
+              <a:pPr/>
               <a:t>‹Nr.›</a:t>
             </a:fld>
             <a:endParaRPr lang="de-DE"/>
@@ -3448,9 +3472,7 @@
             </a:prstGeom>
             <a:noFill/>
             <a:ln>
-              <a:solidFill>
-                <a:schemeClr val="accent2"/>
-              </a:solidFill>
+              <a:noFill/>
             </a:ln>
           </p:spPr>
           <p:txBody>
@@ -3559,8 +3581,8 @@
           </p:nvSpPr>
           <p:spPr>
             <a:xfrm>
-              <a:off x="1388278" y="2996952"/>
-              <a:ext cx="2052293" cy="369332"/>
+              <a:off x="1184638" y="2996952"/>
+              <a:ext cx="2615973" cy="369332"/>
             </a:xfrm>
             <a:prstGeom prst="rect">
               <a:avLst/>
@@ -3579,7 +3601,15 @@
                     <a:schemeClr val="accent2"/>
                   </a:solidFill>
                 </a:rPr>
-                <a:t>Liste SEPA-Aufträge</a:t>
+                <a:t>Liste </a:t>
+              </a:r>
+              <a:r>
+                <a:rPr lang="de-DE" dirty="0" smtClean="0">
+                  <a:solidFill>
+                    <a:schemeClr val="accent2"/>
+                  </a:solidFill>
+                </a:rPr>
+                <a:t>zu zahlende Stunden</a:t>
               </a:r>
               <a:endParaRPr lang="de-DE" dirty="0">
                 <a:solidFill>
@@ -4009,79 +4039,282 @@
           </a:fontRef>
         </p:style>
       </p:cxnSp>
-      <p:cxnSp>
-        <p:nvCxnSpPr>
-          <p:cNvPr id="68" name="Gewinkelte Verbindung 63"/>
-          <p:cNvCxnSpPr>
-            <a:stCxn id="25" idx="1"/>
-          </p:cNvCxnSpPr>
+      <p:sp>
+        <p:nvSpPr>
+          <p:cNvPr id="32" name="Ellipse 31"/>
+          <p:cNvSpPr/>
           <p:nvPr/>
-        </p:nvCxnSpPr>
+        </p:nvSpPr>
         <p:spPr>
-          <a:xfrm rot="10800000">
-            <a:off x="4860032" y="1988840"/>
-            <a:ext cx="216024" cy="3708412"/>
+          <a:xfrm>
+            <a:off x="3275856" y="2780928"/>
+            <a:ext cx="504056" cy="504056"/>
           </a:xfrm>
-          <a:prstGeom prst="bentConnector2">
+          <a:prstGeom prst="ellipse">
             <a:avLst/>
           </a:prstGeom>
-          <a:ln w="38100">
-            <a:tailEnd type="none"/>
-          </a:ln>
         </p:spPr>
         <p:style>
-          <a:lnRef idx="1">
-            <a:schemeClr val="accent1"/>
+          <a:lnRef idx="2">
+            <a:schemeClr val="accent1">
+              <a:shade val="50000"/>
+            </a:schemeClr>
           </a:lnRef>
-          <a:fillRef idx="0">
+          <a:fillRef idx="1">
             <a:schemeClr val="accent1"/>
           </a:fillRef>
           <a:effectRef idx="0">
             <a:schemeClr val="accent1"/>
           </a:effectRef>
           <a:fontRef idx="minor">
-            <a:schemeClr val="tx1"/>
+            <a:schemeClr val="lt1"/>
           </a:fontRef>
         </p:style>
-      </p:cxnSp>
-      <p:cxnSp>
-        <p:nvCxnSpPr>
-          <p:cNvPr id="74" name="Gerade Verbindung mit Pfeil 73"/>
-          <p:cNvCxnSpPr/>
+        <p:txBody>
+          <a:bodyPr rtlCol="0" anchor="ctr"/>
+          <a:lstStyle/>
+          <a:p>
+            <a:pPr algn="ctr"/>
+            <a:r>
+              <a:rPr lang="de-DE" dirty="0" smtClean="0"/>
+              <a:t>3</a:t>
+            </a:r>
+            <a:endParaRPr lang="de-DE" dirty="0"/>
+          </a:p>
+        </p:txBody>
+      </p:sp>
+      <p:sp>
+        <p:nvSpPr>
+          <p:cNvPr id="33" name="Ellipse 32"/>
+          <p:cNvSpPr/>
           <p:nvPr/>
-        </p:nvCxnSpPr>
+        </p:nvSpPr>
         <p:spPr>
-          <a:xfrm flipH="1">
-            <a:off x="3851920" y="1988840"/>
-            <a:ext cx="1008112" cy="0"/>
+          <a:xfrm>
+            <a:off x="3131840" y="836712"/>
+            <a:ext cx="504056" cy="504056"/>
           </a:xfrm>
-          <a:prstGeom prst="straightConnector1">
+          <a:prstGeom prst="ellipse">
             <a:avLst/>
           </a:prstGeom>
-          <a:ln w="38100">
-            <a:tailEnd type="arrow"/>
-          </a:ln>
         </p:spPr>
         <p:style>
-          <a:lnRef idx="1">
-            <a:schemeClr val="accent1"/>
+          <a:lnRef idx="2">
+            <a:schemeClr val="accent1">
+              <a:shade val="50000"/>
+            </a:schemeClr>
           </a:lnRef>
-          <a:fillRef idx="0">
+          <a:fillRef idx="1">
             <a:schemeClr val="accent1"/>
           </a:fillRef>
           <a:effectRef idx="0">
             <a:schemeClr val="accent1"/>
           </a:effectRef>
           <a:fontRef idx="minor">
-            <a:schemeClr val="tx1"/>
+            <a:schemeClr val="lt1"/>
           </a:fontRef>
         </p:style>
-      </p:cxnSp>
+        <p:txBody>
+          <a:bodyPr rtlCol="0" anchor="ctr"/>
+          <a:lstStyle/>
+          <a:p>
+            <a:pPr algn="ctr"/>
+            <a:r>
+              <a:rPr lang="de-DE" dirty="0" smtClean="0"/>
+              <a:t>1</a:t>
+            </a:r>
+            <a:endParaRPr lang="de-DE" dirty="0"/>
+          </a:p>
+        </p:txBody>
+      </p:sp>
+      <p:sp>
+        <p:nvSpPr>
+          <p:cNvPr id="34" name="Ellipse 33"/>
+          <p:cNvSpPr/>
+          <p:nvPr/>
+        </p:nvSpPr>
+        <p:spPr>
+          <a:xfrm>
+            <a:off x="7308304" y="764704"/>
+            <a:ext cx="504056" cy="504056"/>
+          </a:xfrm>
+          <a:prstGeom prst="ellipse">
+            <a:avLst/>
+          </a:prstGeom>
+        </p:spPr>
+        <p:style>
+          <a:lnRef idx="2">
+            <a:schemeClr val="accent1">
+              <a:shade val="50000"/>
+            </a:schemeClr>
+          </a:lnRef>
+          <a:fillRef idx="1">
+            <a:schemeClr val="accent1"/>
+          </a:fillRef>
+          <a:effectRef idx="0">
+            <a:schemeClr val="accent1"/>
+          </a:effectRef>
+          <a:fontRef idx="minor">
+            <a:schemeClr val="lt1"/>
+          </a:fontRef>
+        </p:style>
+        <p:txBody>
+          <a:bodyPr rtlCol="0" anchor="ctr"/>
+          <a:lstStyle/>
+          <a:p>
+            <a:pPr algn="ctr"/>
+            <a:r>
+              <a:rPr lang="de-DE" dirty="0" smtClean="0"/>
+              <a:t>2</a:t>
+            </a:r>
+            <a:endParaRPr lang="de-DE" dirty="0"/>
+          </a:p>
+        </p:txBody>
+      </p:sp>
+      <p:sp>
+        <p:nvSpPr>
+          <p:cNvPr id="35" name="Ellipse 34"/>
+          <p:cNvSpPr/>
+          <p:nvPr/>
+        </p:nvSpPr>
+        <p:spPr>
+          <a:xfrm>
+            <a:off x="7452320" y="2924944"/>
+            <a:ext cx="504056" cy="504056"/>
+          </a:xfrm>
+          <a:prstGeom prst="ellipse">
+            <a:avLst/>
+          </a:prstGeom>
+        </p:spPr>
+        <p:style>
+          <a:lnRef idx="2">
+            <a:schemeClr val="accent1">
+              <a:shade val="50000"/>
+            </a:schemeClr>
+          </a:lnRef>
+          <a:fillRef idx="1">
+            <a:schemeClr val="accent1"/>
+          </a:fillRef>
+          <a:effectRef idx="0">
+            <a:schemeClr val="accent1"/>
+          </a:effectRef>
+          <a:fontRef idx="minor">
+            <a:schemeClr val="lt1"/>
+          </a:fontRef>
+        </p:style>
+        <p:txBody>
+          <a:bodyPr rtlCol="0" anchor="ctr"/>
+          <a:lstStyle/>
+          <a:p>
+            <a:pPr algn="ctr"/>
+            <a:r>
+              <a:rPr lang="de-DE" dirty="0" smtClean="0"/>
+              <a:t>4</a:t>
+            </a:r>
+            <a:endParaRPr lang="de-DE" dirty="0"/>
+          </a:p>
+        </p:txBody>
+      </p:sp>
+      <p:sp>
+        <p:nvSpPr>
+          <p:cNvPr id="36" name="Ellipse 35"/>
+          <p:cNvSpPr/>
+          <p:nvPr/>
+        </p:nvSpPr>
+        <p:spPr>
+          <a:xfrm>
+            <a:off x="3275856" y="5085184"/>
+            <a:ext cx="504056" cy="504056"/>
+          </a:xfrm>
+          <a:prstGeom prst="ellipse">
+            <a:avLst/>
+          </a:prstGeom>
+        </p:spPr>
+        <p:style>
+          <a:lnRef idx="2">
+            <a:schemeClr val="accent1">
+              <a:shade val="50000"/>
+            </a:schemeClr>
+          </a:lnRef>
+          <a:fillRef idx="1">
+            <a:schemeClr val="accent1"/>
+          </a:fillRef>
+          <a:effectRef idx="0">
+            <a:schemeClr val="accent1"/>
+          </a:effectRef>
+          <a:fontRef idx="minor">
+            <a:schemeClr val="lt1"/>
+          </a:fontRef>
+        </p:style>
+        <p:txBody>
+          <a:bodyPr rtlCol="0" anchor="ctr"/>
+          <a:lstStyle/>
+          <a:p>
+            <a:pPr algn="ctr"/>
+            <a:r>
+              <a:rPr lang="de-DE" dirty="0" smtClean="0"/>
+              <a:t>5</a:t>
+            </a:r>
+            <a:endParaRPr lang="de-DE" dirty="0"/>
+          </a:p>
+        </p:txBody>
+      </p:sp>
+      <p:sp>
+        <p:nvSpPr>
+          <p:cNvPr id="37" name="Ellipse 36"/>
+          <p:cNvSpPr/>
+          <p:nvPr/>
+        </p:nvSpPr>
+        <p:spPr>
+          <a:xfrm>
+            <a:off x="7452320" y="5085184"/>
+            <a:ext cx="504056" cy="504056"/>
+          </a:xfrm>
+          <a:prstGeom prst="ellipse">
+            <a:avLst/>
+          </a:prstGeom>
+        </p:spPr>
+        <p:style>
+          <a:lnRef idx="2">
+            <a:schemeClr val="accent1">
+              <a:shade val="50000"/>
+            </a:schemeClr>
+          </a:lnRef>
+          <a:fillRef idx="1">
+            <a:schemeClr val="accent1"/>
+          </a:fillRef>
+          <a:effectRef idx="0">
+            <a:schemeClr val="accent1"/>
+          </a:effectRef>
+          <a:fontRef idx="minor">
+            <a:schemeClr val="lt1"/>
+          </a:fontRef>
+        </p:style>
+        <p:txBody>
+          <a:bodyPr rtlCol="0" anchor="ctr"/>
+          <a:lstStyle/>
+          <a:p>
+            <a:pPr algn="ctr"/>
+            <a:r>
+              <a:rPr lang="de-DE" dirty="0" smtClean="0"/>
+              <a:t>6</a:t>
+            </a:r>
+            <a:endParaRPr lang="de-DE" dirty="0"/>
+          </a:p>
+        </p:txBody>
+      </p:sp>
     </p:spTree>
   </p:cSld>
   <p:clrMapOvr>
     <a:masterClrMapping/>
   </p:clrMapOvr>
+  <p:timing>
+    <p:tnLst>
+      <p:par>
+        <p:cTn id="1" dur="indefinite" restart="never" nodeType="tmRoot"/>
+      </p:par>
+    </p:tnLst>
+  </p:timing>
 </p:sld>
 </file>
 

</xml_diff>